<commit_message>
Added cart functionality to supplements page
</commit_message>
<xml_diff>
--- a/doc/schema_v1.pptx
+++ b/doc/schema_v1.pptx
@@ -302,7 +302,7 @@
           <a:p>
             <a:fld id="{8AB61DD0-1C73-8248-9B13-015BC3D96235}" type="datetimeFigureOut">
               <a:rPr lang="en-US" smtClean="0"/>
-              <a:t>6/20/13</a:t>
+              <a:t>7/26/13</a:t>
             </a:fld>
             <a:endParaRPr lang="en-US"/>
           </a:p>
@@ -472,7 +472,7 @@
           <a:p>
             <a:fld id="{8AB61DD0-1C73-8248-9B13-015BC3D96235}" type="datetimeFigureOut">
               <a:rPr lang="en-US" smtClean="0"/>
-              <a:t>6/20/13</a:t>
+              <a:t>7/26/13</a:t>
             </a:fld>
             <a:endParaRPr lang="en-US"/>
           </a:p>
@@ -652,7 +652,7 @@
           <a:p>
             <a:fld id="{8AB61DD0-1C73-8248-9B13-015BC3D96235}" type="datetimeFigureOut">
               <a:rPr lang="en-US" smtClean="0"/>
-              <a:t>6/20/13</a:t>
+              <a:t>7/26/13</a:t>
             </a:fld>
             <a:endParaRPr lang="en-US"/>
           </a:p>
@@ -822,7 +822,7 @@
           <a:p>
             <a:fld id="{8AB61DD0-1C73-8248-9B13-015BC3D96235}" type="datetimeFigureOut">
               <a:rPr lang="en-US" smtClean="0"/>
-              <a:t>6/20/13</a:t>
+              <a:t>7/26/13</a:t>
             </a:fld>
             <a:endParaRPr lang="en-US"/>
           </a:p>
@@ -1068,7 +1068,7 @@
           <a:p>
             <a:fld id="{8AB61DD0-1C73-8248-9B13-015BC3D96235}" type="datetimeFigureOut">
               <a:rPr lang="en-US" smtClean="0"/>
-              <a:t>6/20/13</a:t>
+              <a:t>7/26/13</a:t>
             </a:fld>
             <a:endParaRPr lang="en-US"/>
           </a:p>
@@ -1356,7 +1356,7 @@
           <a:p>
             <a:fld id="{8AB61DD0-1C73-8248-9B13-015BC3D96235}" type="datetimeFigureOut">
               <a:rPr lang="en-US" smtClean="0"/>
-              <a:t>6/20/13</a:t>
+              <a:t>7/26/13</a:t>
             </a:fld>
             <a:endParaRPr lang="en-US"/>
           </a:p>
@@ -1778,7 +1778,7 @@
           <a:p>
             <a:fld id="{8AB61DD0-1C73-8248-9B13-015BC3D96235}" type="datetimeFigureOut">
               <a:rPr lang="en-US" smtClean="0"/>
-              <a:t>6/20/13</a:t>
+              <a:t>7/26/13</a:t>
             </a:fld>
             <a:endParaRPr lang="en-US"/>
           </a:p>
@@ -1896,7 +1896,7 @@
           <a:p>
             <a:fld id="{8AB61DD0-1C73-8248-9B13-015BC3D96235}" type="datetimeFigureOut">
               <a:rPr lang="en-US" smtClean="0"/>
-              <a:t>6/20/13</a:t>
+              <a:t>7/26/13</a:t>
             </a:fld>
             <a:endParaRPr lang="en-US"/>
           </a:p>
@@ -1991,7 +1991,7 @@
           <a:p>
             <a:fld id="{8AB61DD0-1C73-8248-9B13-015BC3D96235}" type="datetimeFigureOut">
               <a:rPr lang="en-US" smtClean="0"/>
-              <a:t>6/20/13</a:t>
+              <a:t>7/26/13</a:t>
             </a:fld>
             <a:endParaRPr lang="en-US"/>
           </a:p>
@@ -2268,7 +2268,7 @@
           <a:p>
             <a:fld id="{8AB61DD0-1C73-8248-9B13-015BC3D96235}" type="datetimeFigureOut">
               <a:rPr lang="en-US" smtClean="0"/>
-              <a:t>6/20/13</a:t>
+              <a:t>7/26/13</a:t>
             </a:fld>
             <a:endParaRPr lang="en-US"/>
           </a:p>
@@ -2521,7 +2521,7 @@
           <a:p>
             <a:fld id="{8AB61DD0-1C73-8248-9B13-015BC3D96235}" type="datetimeFigureOut">
               <a:rPr lang="en-US" smtClean="0"/>
-              <a:t>6/20/13</a:t>
+              <a:t>7/26/13</a:t>
             </a:fld>
             <a:endParaRPr lang="en-US"/>
           </a:p>
@@ -2734,7 +2734,7 @@
           <a:p>
             <a:fld id="{8AB61DD0-1C73-8248-9B13-015BC3D96235}" type="datetimeFigureOut">
               <a:rPr lang="en-US" smtClean="0"/>
-              <a:t>6/20/13</a:t>
+              <a:t>7/26/13</a:t>
             </a:fld>
             <a:endParaRPr lang="en-US"/>
           </a:p>
@@ -6722,15 +6722,7 @@
                   <a:schemeClr val="tx1"/>
                 </a:solidFill>
               </a:rPr>
-              <a:t>ADHD </a:t>
-            </a:r>
-            <a:r>
-              <a:rPr lang="en-US" dirty="0" smtClean="0">
-                <a:solidFill>
-                  <a:schemeClr val="tx1"/>
-                </a:solidFill>
-              </a:rPr>
-              <a:t>Profile</a:t>
+              <a:t>ADHD Profile</a:t>
             </a:r>
             <a:endParaRPr lang="en-US" dirty="0">
               <a:solidFill>
@@ -6740,90 +6732,76 @@
           </a:p>
         </p:txBody>
       </p:sp>
-      <p:grpSp>
-        <p:nvGrpSpPr>
-          <p:cNvPr id="23" name="Group 22"/>
-          <p:cNvGrpSpPr/>
+      <p:cxnSp>
+        <p:nvCxnSpPr>
+          <p:cNvPr id="21" name="Straight Arrow Connector 20"/>
+          <p:cNvCxnSpPr/>
           <p:nvPr/>
-        </p:nvGrpSpPr>
-        <p:grpSpPr>
+        </p:nvCxnSpPr>
+        <p:spPr>
           <a:xfrm>
-            <a:off x="4317123" y="685124"/>
-            <a:ext cx="8240" cy="574324"/>
-            <a:chOff x="2708469" y="685124"/>
-            <a:chExt cx="8240" cy="574324"/>
-          </a:xfrm>
-        </p:grpSpPr>
-        <p:cxnSp>
-          <p:nvCxnSpPr>
-            <p:cNvPr id="21" name="Straight Arrow Connector 20"/>
-            <p:cNvCxnSpPr>
-              <a:stCxn id="14" idx="2"/>
-              <a:endCxn id="13" idx="0"/>
-            </p:cNvCxnSpPr>
-            <p:nvPr/>
-          </p:nvCxnSpPr>
-          <p:spPr>
-            <a:xfrm>
-              <a:off x="2716709" y="793204"/>
-              <a:ext cx="0" cy="466244"/>
-            </a:xfrm>
-            <a:prstGeom prst="straightConnector1">
-              <a:avLst/>
-            </a:prstGeom>
-            <a:ln>
-              <a:tailEnd type="arrow"/>
-            </a:ln>
-          </p:spPr>
-          <p:style>
-            <a:lnRef idx="2">
-              <a:schemeClr val="accent1"/>
-            </a:lnRef>
-            <a:fillRef idx="0">
-              <a:schemeClr val="accent1"/>
-            </a:fillRef>
-            <a:effectRef idx="1">
-              <a:schemeClr val="accent1"/>
-            </a:effectRef>
-            <a:fontRef idx="minor">
-              <a:schemeClr val="tx1"/>
-            </a:fontRef>
-          </p:style>
-        </p:cxnSp>
-        <p:cxnSp>
-          <p:nvCxnSpPr>
-            <p:cNvPr id="22" name="Straight Arrow Connector 21"/>
-            <p:cNvCxnSpPr/>
-            <p:nvPr/>
-          </p:nvCxnSpPr>
-          <p:spPr>
-            <a:xfrm>
-              <a:off x="2708469" y="685124"/>
-              <a:ext cx="0" cy="466244"/>
-            </a:xfrm>
-            <a:prstGeom prst="straightConnector1">
-              <a:avLst/>
-            </a:prstGeom>
-            <a:ln>
-              <a:tailEnd type="arrow"/>
-            </a:ln>
-          </p:spPr>
-          <p:style>
-            <a:lnRef idx="2">
-              <a:schemeClr val="accent1"/>
-            </a:lnRef>
-            <a:fillRef idx="0">
-              <a:schemeClr val="accent1"/>
-            </a:fillRef>
-            <a:effectRef idx="1">
-              <a:schemeClr val="accent1"/>
-            </a:effectRef>
-            <a:fontRef idx="minor">
-              <a:schemeClr val="tx1"/>
-            </a:fontRef>
-          </p:style>
-        </p:cxnSp>
-      </p:grpSp>
+            <a:off x="4343309" y="819741"/>
+            <a:ext cx="0" cy="466244"/>
+          </a:xfrm>
+          <a:prstGeom prst="straightConnector1">
+            <a:avLst/>
+          </a:prstGeom>
+          <a:ln>
+            <a:tailEnd type="arrow"/>
+          </a:ln>
+        </p:spPr>
+        <p:style>
+          <a:lnRef idx="2">
+            <a:schemeClr val="accent1"/>
+          </a:lnRef>
+          <a:fillRef idx="0">
+            <a:schemeClr val="accent1"/>
+          </a:fillRef>
+          <a:effectRef idx="1">
+            <a:schemeClr val="accent1"/>
+          </a:effectRef>
+          <a:fontRef idx="minor">
+            <a:schemeClr val="tx1"/>
+          </a:fontRef>
+        </p:style>
+      </p:cxnSp>
+      <p:cxnSp>
+        <p:nvCxnSpPr>
+          <p:cNvPr id="22" name="Straight Arrow Connector 21"/>
+          <p:cNvCxnSpPr/>
+          <p:nvPr/>
+        </p:nvCxnSpPr>
+        <p:spPr>
+          <a:xfrm>
+            <a:off x="4343309" y="712482"/>
+            <a:ext cx="0" cy="466244"/>
+          </a:xfrm>
+          <a:prstGeom prst="straightConnector1">
+            <a:avLst/>
+          </a:prstGeom>
+          <a:ln w="28575" cmpd="sng">
+            <a:solidFill>
+              <a:srgbClr val="4F81BD"/>
+            </a:solidFill>
+            <a:headEnd type="triangle" w="lg" len="med"/>
+            <a:tailEnd type="triangle" w="lg" len="med"/>
+          </a:ln>
+        </p:spPr>
+        <p:style>
+          <a:lnRef idx="2">
+            <a:schemeClr val="accent1"/>
+          </a:lnRef>
+          <a:fillRef idx="0">
+            <a:schemeClr val="accent1"/>
+          </a:fillRef>
+          <a:effectRef idx="1">
+            <a:schemeClr val="accent1"/>
+          </a:effectRef>
+          <a:fontRef idx="minor">
+            <a:schemeClr val="tx1"/>
+          </a:fontRef>
+        </p:style>
+      </p:cxnSp>
       <p:sp>
         <p:nvSpPr>
           <p:cNvPr id="14" name="Rectangle 13"/>
@@ -6832,7 +6810,7 @@
         </p:nvSpPr>
         <p:spPr>
           <a:xfrm>
-            <a:off x="3519437" y="337361"/>
+            <a:off x="3519437" y="263280"/>
             <a:ext cx="1611852" cy="455843"/>
           </a:xfrm>
           <a:prstGeom prst="rect">
@@ -7048,8 +7026,8 @@
         </p:nvCxnSpPr>
         <p:spPr>
           <a:xfrm>
-            <a:off x="3292040" y="4098066"/>
-            <a:ext cx="0" cy="651195"/>
+            <a:off x="3292040" y="4250466"/>
+            <a:ext cx="0" cy="498795"/>
           </a:xfrm>
           <a:prstGeom prst="line">
             <a:avLst/>
@@ -7802,11 +7780,6 @@
               </a:rPr>
               <a:t>Nutritionist</a:t>
             </a:r>
-            <a:endParaRPr lang="en-US" dirty="0" smtClean="0">
-              <a:solidFill>
-                <a:schemeClr val="tx1"/>
-              </a:solidFill>
-            </a:endParaRPr>
           </a:p>
         </p:txBody>
       </p:sp>
@@ -7918,11 +7891,6 @@
               </a:rPr>
               <a:t>RN</a:t>
             </a:r>
-            <a:endParaRPr lang="en-US" dirty="0" smtClean="0">
-              <a:solidFill>
-                <a:schemeClr val="tx1"/>
-              </a:solidFill>
-            </a:endParaRPr>
           </a:p>
         </p:txBody>
       </p:sp>
@@ -8366,6 +8334,43 @@
           </a:p>
         </p:txBody>
       </p:sp>
+      <p:cxnSp>
+        <p:nvCxnSpPr>
+          <p:cNvPr id="61" name="Straight Arrow Connector 60"/>
+          <p:cNvCxnSpPr/>
+          <p:nvPr/>
+        </p:nvCxnSpPr>
+        <p:spPr>
+          <a:xfrm>
+            <a:off x="5834180" y="945604"/>
+            <a:ext cx="0" cy="466244"/>
+          </a:xfrm>
+          <a:prstGeom prst="straightConnector1">
+            <a:avLst/>
+          </a:prstGeom>
+          <a:ln w="28575" cmpd="sng">
+            <a:solidFill>
+              <a:srgbClr val="4F81BD"/>
+            </a:solidFill>
+            <a:headEnd type="triangle" w="lg" len="med"/>
+            <a:tailEnd type="triangle" w="lg" len="med"/>
+          </a:ln>
+        </p:spPr>
+        <p:style>
+          <a:lnRef idx="2">
+            <a:schemeClr val="accent1"/>
+          </a:lnRef>
+          <a:fillRef idx="0">
+            <a:schemeClr val="accent1"/>
+          </a:fillRef>
+          <a:effectRef idx="1">
+            <a:schemeClr val="accent1"/>
+          </a:effectRef>
+          <a:fontRef idx="minor">
+            <a:schemeClr val="tx1"/>
+          </a:fontRef>
+        </p:style>
+      </p:cxnSp>
     </p:spTree>
     <p:extLst>
       <p:ext uri="{BB962C8B-B14F-4D97-AF65-F5344CB8AC3E}">
@@ -9333,13 +9338,6 @@
               </a:rPr>
               <a:t>Nutritionist</a:t>
             </a:r>
-            <a:endParaRPr lang="en-US" dirty="0" smtClean="0">
-              <a:solidFill>
-                <a:schemeClr val="bg1">
-                  <a:lumMod val="75000"/>
-                </a:schemeClr>
-              </a:solidFill>
-            </a:endParaRPr>
           </a:p>
         </p:txBody>
       </p:sp>
@@ -9461,13 +9459,6 @@
               </a:rPr>
               <a:t>RN</a:t>
             </a:r>
-            <a:endParaRPr lang="en-US" dirty="0" smtClean="0">
-              <a:solidFill>
-                <a:schemeClr val="bg1">
-                  <a:lumMod val="75000"/>
-                </a:schemeClr>
-              </a:solidFill>
-            </a:endParaRPr>
           </a:p>
         </p:txBody>
       </p:sp>
@@ -13048,7 +13039,7 @@
         <p:spPr/>
         <p:txBody>
           <a:bodyPr>
-            <a:normAutofit fontScale="62500" lnSpcReduction="20000"/>
+            <a:normAutofit fontScale="55000" lnSpcReduction="20000"/>
           </a:bodyPr>
           <a:lstStyle/>
           <a:p>
@@ -13096,20 +13087,52 @@
             </a:r>
             <a:r>
               <a:rPr lang="en-US" sz="1400" dirty="0" smtClean="0"/>
-              <a:t>instance properties:</a:t>
-            </a:r>
-          </a:p>
-          <a:p>
-            <a:pPr marL="0" indent="0">
-              <a:buNone/>
-            </a:pPr>
-            <a:r>
-              <a:rPr lang="en-US" sz="1400" dirty="0"/>
-              <a:t>	</a:t>
-            </a:r>
-            <a:r>
-              <a:rPr lang="en-US" sz="1400" dirty="0" smtClean="0"/>
-              <a:t>	name: String</a:t>
+              <a:t>instance </a:t>
+            </a:r>
+            <a:r>
+              <a:rPr lang="en-US" sz="1400" smtClean="0"/>
+              <a:t>properties</a:t>
+            </a:r>
+            <a:r>
+              <a:rPr lang="en-US" sz="1400" smtClean="0"/>
+              <a:t>:</a:t>
+            </a:r>
+          </a:p>
+          <a:p>
+            <a:pPr marL="0" indent="0">
+              <a:buNone/>
+            </a:pPr>
+            <a:endParaRPr lang="en-US" sz="1400" dirty="0" smtClean="0"/>
+          </a:p>
+          <a:p>
+            <a:pPr marL="0" indent="0">
+              <a:buNone/>
+            </a:pPr>
+            <a:r>
+              <a:rPr lang="en-US" sz="1400" dirty="0"/>
+              <a:t>	</a:t>
+            </a:r>
+            <a:r>
+              <a:rPr lang="en-US" sz="1400" dirty="0"/>
+              <a:t>	</a:t>
+            </a:r>
+            <a:r>
+              <a:rPr lang="en-US" sz="1400" dirty="0" smtClean="0"/>
+              <a:t># attributes</a:t>
+            </a:r>
+            <a:endParaRPr lang="en-US" sz="1400" dirty="0" smtClean="0"/>
+          </a:p>
+          <a:p>
+            <a:pPr marL="0" indent="0">
+              <a:buNone/>
+            </a:pPr>
+            <a:r>
+              <a:rPr lang="en-US" sz="1400" dirty="0" smtClean="0"/>
+              <a:t>		name</a:t>
+            </a:r>
+            <a:r>
+              <a:rPr lang="en-US" sz="1400" dirty="0" smtClean="0"/>
+              <a:t>: String</a:t>
             </a:r>
           </a:p>
           <a:p>

</xml_diff>